<commit_message>
Add LFS part slides
</commit_message>
<xml_diff>
--- a/GitTutorialPPT.pptx
+++ b/GitTutorialPPT.pptx
@@ -5,7 +5,7 @@
     <p:sldMasterId id="2147483696" r:id="rId1"/>
   </p:sldMasterIdLst>
   <p:notesMasterIdLst>
-    <p:notesMasterId r:id="rId20"/>
+    <p:notesMasterId r:id="rId23"/>
   </p:notesMasterIdLst>
   <p:sldIdLst>
     <p:sldId id="256" r:id="rId2"/>
@@ -26,6 +26,9 @@
     <p:sldId id="270" r:id="rId17"/>
     <p:sldId id="271" r:id="rId18"/>
     <p:sldId id="273" r:id="rId19"/>
+    <p:sldId id="274" r:id="rId20"/>
+    <p:sldId id="276" r:id="rId21"/>
+    <p:sldId id="275" r:id="rId22"/>
   </p:sldIdLst>
   <p:sldSz cx="12192000" cy="6858000"/>
   <p:notesSz cx="6858000" cy="9144000"/>
@@ -214,7 +217,7 @@
           <a:p>
             <a:fld id="{D8B09957-E679-412F-93D7-BE364928AAC9}" type="datetimeFigureOut">
               <a:rPr lang="zh-CN" altLang="en-US" smtClean="0"/>
-              <a:t>2020/3/5</a:t>
+              <a:t>2020/4/5</a:t>
             </a:fld>
             <a:endParaRPr lang="zh-CN" altLang="en-US"/>
           </a:p>
@@ -780,7 +783,7 @@
           <a:p>
             <a:fld id="{EF28BAA7-70DB-4290-9BB0-E4E7CA64E1B5}" type="datetimeFigureOut">
               <a:rPr lang="zh-CN" altLang="en-US" smtClean="0"/>
-              <a:t>2020/3/5</a:t>
+              <a:t>2020/4/5</a:t>
             </a:fld>
             <a:endParaRPr lang="zh-CN" altLang="en-US"/>
           </a:p>
@@ -950,7 +953,7 @@
           <a:p>
             <a:fld id="{EF28BAA7-70DB-4290-9BB0-E4E7CA64E1B5}" type="datetimeFigureOut">
               <a:rPr lang="zh-CN" altLang="en-US" smtClean="0"/>
-              <a:t>2020/3/5</a:t>
+              <a:t>2020/4/5</a:t>
             </a:fld>
             <a:endParaRPr lang="zh-CN" altLang="en-US"/>
           </a:p>
@@ -1130,7 +1133,7 @@
           <a:p>
             <a:fld id="{EF28BAA7-70DB-4290-9BB0-E4E7CA64E1B5}" type="datetimeFigureOut">
               <a:rPr lang="zh-CN" altLang="en-US" smtClean="0"/>
-              <a:t>2020/3/5</a:t>
+              <a:t>2020/4/5</a:t>
             </a:fld>
             <a:endParaRPr lang="zh-CN" altLang="en-US"/>
           </a:p>
@@ -1300,7 +1303,7 @@
           <a:p>
             <a:fld id="{EF28BAA7-70DB-4290-9BB0-E4E7CA64E1B5}" type="datetimeFigureOut">
               <a:rPr lang="zh-CN" altLang="en-US" smtClean="0"/>
-              <a:t>2020/3/5</a:t>
+              <a:t>2020/4/5</a:t>
             </a:fld>
             <a:endParaRPr lang="zh-CN" altLang="en-US"/>
           </a:p>
@@ -1546,7 +1549,7 @@
           <a:p>
             <a:fld id="{EF28BAA7-70DB-4290-9BB0-E4E7CA64E1B5}" type="datetimeFigureOut">
               <a:rPr lang="zh-CN" altLang="en-US" smtClean="0"/>
-              <a:t>2020/3/5</a:t>
+              <a:t>2020/4/5</a:t>
             </a:fld>
             <a:endParaRPr lang="zh-CN" altLang="en-US"/>
           </a:p>
@@ -1778,7 +1781,7 @@
           <a:p>
             <a:fld id="{EF28BAA7-70DB-4290-9BB0-E4E7CA64E1B5}" type="datetimeFigureOut">
               <a:rPr lang="zh-CN" altLang="en-US" smtClean="0"/>
-              <a:t>2020/3/5</a:t>
+              <a:t>2020/4/5</a:t>
             </a:fld>
             <a:endParaRPr lang="zh-CN" altLang="en-US"/>
           </a:p>
@@ -2145,7 +2148,7 @@
           <a:p>
             <a:fld id="{EF28BAA7-70DB-4290-9BB0-E4E7CA64E1B5}" type="datetimeFigureOut">
               <a:rPr lang="zh-CN" altLang="en-US" smtClean="0"/>
-              <a:t>2020/3/5</a:t>
+              <a:t>2020/4/5</a:t>
             </a:fld>
             <a:endParaRPr lang="zh-CN" altLang="en-US"/>
           </a:p>
@@ -2263,7 +2266,7 @@
           <a:p>
             <a:fld id="{EF28BAA7-70DB-4290-9BB0-E4E7CA64E1B5}" type="datetimeFigureOut">
               <a:rPr lang="zh-CN" altLang="en-US" smtClean="0"/>
-              <a:t>2020/3/5</a:t>
+              <a:t>2020/4/5</a:t>
             </a:fld>
             <a:endParaRPr lang="zh-CN" altLang="en-US"/>
           </a:p>
@@ -2358,7 +2361,7 @@
           <a:p>
             <a:fld id="{EF28BAA7-70DB-4290-9BB0-E4E7CA64E1B5}" type="datetimeFigureOut">
               <a:rPr lang="zh-CN" altLang="en-US" smtClean="0"/>
-              <a:t>2020/3/5</a:t>
+              <a:t>2020/4/5</a:t>
             </a:fld>
             <a:endParaRPr lang="zh-CN" altLang="en-US"/>
           </a:p>
@@ -2635,7 +2638,7 @@
           <a:p>
             <a:fld id="{EF28BAA7-70DB-4290-9BB0-E4E7CA64E1B5}" type="datetimeFigureOut">
               <a:rPr lang="zh-CN" altLang="en-US" smtClean="0"/>
-              <a:t>2020/3/5</a:t>
+              <a:t>2020/4/5</a:t>
             </a:fld>
             <a:endParaRPr lang="zh-CN" altLang="en-US"/>
           </a:p>
@@ -2892,7 +2895,7 @@
           <a:p>
             <a:fld id="{EF28BAA7-70DB-4290-9BB0-E4E7CA64E1B5}" type="datetimeFigureOut">
               <a:rPr lang="zh-CN" altLang="en-US" smtClean="0"/>
-              <a:t>2020/3/5</a:t>
+              <a:t>2020/4/5</a:t>
             </a:fld>
             <a:endParaRPr lang="zh-CN" altLang="en-US"/>
           </a:p>
@@ -3105,7 +3108,7 @@
           <a:p>
             <a:fld id="{EF28BAA7-70DB-4290-9BB0-E4E7CA64E1B5}" type="datetimeFigureOut">
               <a:rPr lang="zh-CN" altLang="en-US" smtClean="0"/>
-              <a:t>2020/3/5</a:t>
+              <a:t>2020/4/5</a:t>
             </a:fld>
             <a:endParaRPr lang="zh-CN" altLang="en-US"/>
           </a:p>
@@ -4658,6 +4661,65 @@
 </p:sld>
 </file>
 
+<file path=ppt/slides/slide19.xml><?xml version="1.0" encoding="utf-8"?>
+<p:sld xmlns:a="http://schemas.openxmlformats.org/drawingml/2006/main" xmlns:r="http://schemas.openxmlformats.org/officeDocument/2006/relationships" xmlns:p="http://schemas.openxmlformats.org/presentationml/2006/main">
+  <p:cSld>
+    <p:spTree>
+      <p:nvGrpSpPr>
+        <p:cNvPr id="1" name=""/>
+        <p:cNvGrpSpPr/>
+        <p:nvPr/>
+      </p:nvGrpSpPr>
+      <p:grpSpPr>
+        <a:xfrm>
+          <a:off x="0" y="0"/>
+          <a:ext cx="0" cy="0"/>
+          <a:chOff x="0" y="0"/>
+          <a:chExt cx="0" cy="0"/>
+        </a:xfrm>
+      </p:grpSpPr>
+      <p:sp>
+        <p:nvSpPr>
+          <p:cNvPr id="2" name="标题 1">
+            <a:extLst>
+              <a:ext uri="{FF2B5EF4-FFF2-40B4-BE49-F238E27FC236}">
+                <a16:creationId xmlns:a16="http://schemas.microsoft.com/office/drawing/2014/main" id="{2308C36A-B5A2-45CB-9BA2-2CADC955F9EE}"/>
+              </a:ext>
+            </a:extLst>
+          </p:cNvPr>
+          <p:cNvSpPr>
+            <a:spLocks noGrp="1"/>
+          </p:cNvSpPr>
+          <p:nvPr>
+            <p:ph type="ctrTitle"/>
+          </p:nvPr>
+        </p:nvSpPr>
+        <p:spPr/>
+        <p:txBody>
+          <a:bodyPr/>
+          <a:lstStyle/>
+          <a:p>
+            <a:r>
+              <a:rPr lang="en-US" altLang="zh-CN" dirty="0"/>
+              <a:t>Git LFS</a:t>
+            </a:r>
+            <a:endParaRPr lang="zh-CN" altLang="en-US" dirty="0"/>
+          </a:p>
+        </p:txBody>
+      </p:sp>
+    </p:spTree>
+    <p:extLst>
+      <p:ext uri="{BB962C8B-B14F-4D97-AF65-F5344CB8AC3E}">
+        <p14:creationId xmlns:p14="http://schemas.microsoft.com/office/powerpoint/2010/main" val="2598130012"/>
+      </p:ext>
+    </p:extLst>
+  </p:cSld>
+  <p:clrMapOvr>
+    <a:masterClrMapping/>
+  </p:clrMapOvr>
+</p:sld>
+</file>
+
 <file path=ppt/slides/slide2.xml><?xml version="1.0" encoding="utf-8"?>
 <p:sld xmlns:a="http://schemas.openxmlformats.org/drawingml/2006/main" xmlns:r="http://schemas.openxmlformats.org/officeDocument/2006/relationships" xmlns:p="http://schemas.openxmlformats.org/presentationml/2006/main">
   <p:cSld>
@@ -5226,6 +5288,1048 @@
     <p:bldLst>
       <p:bldP spid="7" grpId="0" animBg="1"/>
     </p:bldLst>
+  </p:timing>
+</p:sld>
+</file>
+
+<file path=ppt/slides/slide20.xml><?xml version="1.0" encoding="utf-8"?>
+<p:sld xmlns:a="http://schemas.openxmlformats.org/drawingml/2006/main" xmlns:r="http://schemas.openxmlformats.org/officeDocument/2006/relationships" xmlns:p="http://schemas.openxmlformats.org/presentationml/2006/main">
+  <p:cSld>
+    <p:spTree>
+      <p:nvGrpSpPr>
+        <p:cNvPr id="1" name=""/>
+        <p:cNvGrpSpPr/>
+        <p:nvPr/>
+      </p:nvGrpSpPr>
+      <p:grpSpPr>
+        <a:xfrm>
+          <a:off x="0" y="0"/>
+          <a:ext cx="0" cy="0"/>
+          <a:chOff x="0" y="0"/>
+          <a:chExt cx="0" cy="0"/>
+        </a:xfrm>
+      </p:grpSpPr>
+      <p:sp>
+        <p:nvSpPr>
+          <p:cNvPr id="2" name="标题 1">
+            <a:extLst>
+              <a:ext uri="{FF2B5EF4-FFF2-40B4-BE49-F238E27FC236}">
+                <a16:creationId xmlns:a16="http://schemas.microsoft.com/office/drawing/2014/main" id="{5854A3FD-3CA3-4958-93EE-B540B1AFF031}"/>
+              </a:ext>
+            </a:extLst>
+          </p:cNvPr>
+          <p:cNvSpPr>
+            <a:spLocks noGrp="1"/>
+          </p:cNvSpPr>
+          <p:nvPr>
+            <p:ph type="title"/>
+          </p:nvPr>
+        </p:nvSpPr>
+        <p:spPr/>
+        <p:txBody>
+          <a:bodyPr>
+            <a:normAutofit/>
+          </a:bodyPr>
+          <a:lstStyle/>
+          <a:p>
+            <a:r>
+              <a:rPr lang="en-US" altLang="zh-CN" sz="3600" dirty="0"/>
+              <a:t>Problems with Large binary files</a:t>
+            </a:r>
+            <a:endParaRPr lang="zh-CN" altLang="en-US" sz="3600" dirty="0"/>
+          </a:p>
+        </p:txBody>
+      </p:sp>
+      <p:sp>
+        <p:nvSpPr>
+          <p:cNvPr id="3" name="内容占位符 2">
+            <a:extLst>
+              <a:ext uri="{FF2B5EF4-FFF2-40B4-BE49-F238E27FC236}">
+                <a16:creationId xmlns:a16="http://schemas.microsoft.com/office/drawing/2014/main" id="{C6945FC7-E300-45DA-BE7C-5F13D6191314}"/>
+              </a:ext>
+            </a:extLst>
+          </p:cNvPr>
+          <p:cNvSpPr>
+            <a:spLocks noGrp="1"/>
+          </p:cNvSpPr>
+          <p:nvPr>
+            <p:ph idx="1"/>
+          </p:nvPr>
+        </p:nvSpPr>
+        <p:spPr/>
+        <p:txBody>
+          <a:bodyPr/>
+          <a:lstStyle/>
+          <a:p>
+            <a:r>
+              <a:rPr lang="en-US" altLang="zh-CN" dirty="0"/>
+              <a:t>Git LFS: Git Large File Storage</a:t>
+            </a:r>
+          </a:p>
+          <a:p>
+            <a:r>
+              <a:rPr lang="en-US" altLang="zh-CN" dirty="0"/>
+              <a:t>Big files: </a:t>
+            </a:r>
+            <a:r>
+              <a:rPr lang="en-US" altLang="zh-CN" dirty="0" err="1"/>
+              <a:t>xxx.psd</a:t>
+            </a:r>
+            <a:r>
+              <a:rPr lang="en-US" altLang="zh-CN" dirty="0"/>
+              <a:t>, </a:t>
+            </a:r>
+            <a:r>
+              <a:rPr lang="en-US" altLang="zh-CN" dirty="0" err="1"/>
+              <a:t>xxx.fbx</a:t>
+            </a:r>
+            <a:r>
+              <a:rPr lang="en-US" altLang="zh-CN" dirty="0"/>
+              <a:t>, </a:t>
+            </a:r>
+            <a:r>
+              <a:rPr lang="en-US" altLang="zh-CN" dirty="0" err="1"/>
+              <a:t>xxx.aiff</a:t>
+            </a:r>
+            <a:r>
+              <a:rPr lang="en-US" altLang="zh-CN" dirty="0"/>
+              <a:t>, …</a:t>
+            </a:r>
+          </a:p>
+          <a:p>
+            <a:r>
+              <a:rPr lang="en-US" altLang="zh-CN" dirty="0"/>
+              <a:t>Any changes you made to binary files are tracked as an additional copy of the files</a:t>
+            </a:r>
+          </a:p>
+          <a:p>
+            <a:pPr lvl="1"/>
+            <a:r>
+              <a:rPr lang="en-US" altLang="zh-CN" dirty="0"/>
+              <a:t>Local repo: Image = 100MB</a:t>
+            </a:r>
+          </a:p>
+          <a:p>
+            <a:pPr lvl="1"/>
+            <a:r>
+              <a:rPr lang="en-US" altLang="zh-CN" dirty="0"/>
+              <a:t>Image(1) = 100MB</a:t>
+            </a:r>
+          </a:p>
+          <a:p>
+            <a:pPr lvl="1"/>
+            <a:r>
+              <a:rPr lang="en-US" altLang="zh-CN" dirty="0"/>
+              <a:t>Image(2) = 100MB</a:t>
+            </a:r>
+          </a:p>
+          <a:p>
+            <a:pPr lvl="1"/>
+            <a:r>
+              <a:rPr lang="en-US" altLang="zh-CN" dirty="0"/>
+              <a:t>…</a:t>
+            </a:r>
+          </a:p>
+          <a:p>
+            <a:r>
+              <a:rPr lang="en-US" altLang="zh-CN" dirty="0"/>
+              <a:t>With LFS, working with large assets becomes easier</a:t>
+            </a:r>
+          </a:p>
+          <a:p>
+            <a:endParaRPr lang="zh-CN" altLang="en-US" dirty="0"/>
+          </a:p>
+        </p:txBody>
+      </p:sp>
+      <p:sp>
+        <p:nvSpPr>
+          <p:cNvPr id="4" name="箭头: 右 3">
+            <a:extLst>
+              <a:ext uri="{FF2B5EF4-FFF2-40B4-BE49-F238E27FC236}">
+                <a16:creationId xmlns:a16="http://schemas.microsoft.com/office/drawing/2014/main" id="{9B186684-4FE4-46E3-9033-6486C9443A16}"/>
+              </a:ext>
+            </a:extLst>
+          </p:cNvPr>
+          <p:cNvSpPr/>
+          <p:nvPr/>
+        </p:nvSpPr>
+        <p:spPr>
+          <a:xfrm>
+            <a:off x="5517137" y="4212293"/>
+            <a:ext cx="1490702" cy="345782"/>
+          </a:xfrm>
+          <a:prstGeom prst="rightArrow">
+            <a:avLst/>
+          </a:prstGeom>
+        </p:spPr>
+        <p:style>
+          <a:lnRef idx="2">
+            <a:schemeClr val="dk1">
+              <a:shade val="50000"/>
+            </a:schemeClr>
+          </a:lnRef>
+          <a:fillRef idx="1">
+            <a:schemeClr val="dk1"/>
+          </a:fillRef>
+          <a:effectRef idx="0">
+            <a:schemeClr val="dk1"/>
+          </a:effectRef>
+          <a:fontRef idx="minor">
+            <a:schemeClr val="lt1"/>
+          </a:fontRef>
+        </p:style>
+        <p:txBody>
+          <a:bodyPr rtlCol="0" anchor="ctr"/>
+          <a:lstStyle/>
+          <a:p>
+            <a:pPr algn="ctr"/>
+            <a:endParaRPr lang="zh-CN" altLang="en-US"/>
+          </a:p>
+        </p:txBody>
+      </p:sp>
+      <p:sp>
+        <p:nvSpPr>
+          <p:cNvPr id="5" name="文本框 4">
+            <a:extLst>
+              <a:ext uri="{FF2B5EF4-FFF2-40B4-BE49-F238E27FC236}">
+                <a16:creationId xmlns:a16="http://schemas.microsoft.com/office/drawing/2014/main" id="{53466037-366C-4629-B134-A79C31B75F2B}"/>
+              </a:ext>
+            </a:extLst>
+          </p:cNvPr>
+          <p:cNvSpPr txBox="1"/>
+          <p:nvPr/>
+        </p:nvSpPr>
+        <p:spPr>
+          <a:xfrm>
+            <a:off x="7259811" y="4154351"/>
+            <a:ext cx="3842017" cy="461665"/>
+          </a:xfrm>
+          <a:prstGeom prst="rect">
+            <a:avLst/>
+          </a:prstGeom>
+          <a:noFill/>
+        </p:spPr>
+        <p:txBody>
+          <a:bodyPr wrap="square" rtlCol="0">
+            <a:spAutoFit/>
+          </a:bodyPr>
+          <a:lstStyle/>
+          <a:p>
+            <a:r>
+              <a:rPr lang="en-US" altLang="zh-CN" sz="2400" dirty="0"/>
+              <a:t>Remote repo &gt; 300Mb</a:t>
+            </a:r>
+            <a:endParaRPr lang="zh-CN" altLang="en-US" sz="2400" dirty="0"/>
+          </a:p>
+        </p:txBody>
+      </p:sp>
+    </p:spTree>
+    <p:extLst>
+      <p:ext uri="{BB962C8B-B14F-4D97-AF65-F5344CB8AC3E}">
+        <p14:creationId xmlns:p14="http://schemas.microsoft.com/office/powerpoint/2010/main" val="4155534987"/>
+      </p:ext>
+    </p:extLst>
+  </p:cSld>
+  <p:clrMapOvr>
+    <a:masterClrMapping/>
+  </p:clrMapOvr>
+  <p:timing>
+    <p:tnLst>
+      <p:par>
+        <p:cTn id="1" dur="indefinite" restart="never" nodeType="tmRoot">
+          <p:childTnLst>
+            <p:seq concurrent="1" nextAc="seek">
+              <p:cTn id="2" dur="indefinite" nodeType="mainSeq">
+                <p:childTnLst>
+                  <p:par>
+                    <p:cTn id="3" fill="hold">
+                      <p:stCondLst>
+                        <p:cond delay="indefinite"/>
+                      </p:stCondLst>
+                      <p:childTnLst>
+                        <p:par>
+                          <p:cTn id="4" fill="hold">
+                            <p:stCondLst>
+                              <p:cond delay="0"/>
+                            </p:stCondLst>
+                            <p:childTnLst>
+                              <p:par>
+                                <p:cTn id="5" presetID="1" presetClass="entr" presetSubtype="0" fill="hold" nodeType="clickEffect">
+                                  <p:stCondLst>
+                                    <p:cond delay="0"/>
+                                  </p:stCondLst>
+                                  <p:childTnLst>
+                                    <p:set>
+                                      <p:cBhvr>
+                                        <p:cTn id="6" dur="1" fill="hold">
+                                          <p:stCondLst>
+                                            <p:cond delay="0"/>
+                                          </p:stCondLst>
+                                        </p:cTn>
+                                        <p:tgtEl>
+                                          <p:spTgt spid="3">
+                                            <p:txEl>
+                                              <p:pRg st="0" end="0"/>
+                                            </p:txEl>
+                                          </p:spTgt>
+                                        </p:tgtEl>
+                                        <p:attrNameLst>
+                                          <p:attrName>style.visibility</p:attrName>
+                                        </p:attrNameLst>
+                                      </p:cBhvr>
+                                      <p:to>
+                                        <p:strVal val="visible"/>
+                                      </p:to>
+                                    </p:set>
+                                  </p:childTnLst>
+                                </p:cTn>
+                              </p:par>
+                            </p:childTnLst>
+                          </p:cTn>
+                        </p:par>
+                      </p:childTnLst>
+                    </p:cTn>
+                  </p:par>
+                  <p:par>
+                    <p:cTn id="7" fill="hold">
+                      <p:stCondLst>
+                        <p:cond delay="indefinite"/>
+                      </p:stCondLst>
+                      <p:childTnLst>
+                        <p:par>
+                          <p:cTn id="8" fill="hold">
+                            <p:stCondLst>
+                              <p:cond delay="0"/>
+                            </p:stCondLst>
+                            <p:childTnLst>
+                              <p:par>
+                                <p:cTn id="9" presetID="1" presetClass="entr" presetSubtype="0" fill="hold" nodeType="clickEffect">
+                                  <p:stCondLst>
+                                    <p:cond delay="0"/>
+                                  </p:stCondLst>
+                                  <p:childTnLst>
+                                    <p:set>
+                                      <p:cBhvr>
+                                        <p:cTn id="10" dur="1" fill="hold">
+                                          <p:stCondLst>
+                                            <p:cond delay="0"/>
+                                          </p:stCondLst>
+                                        </p:cTn>
+                                        <p:tgtEl>
+                                          <p:spTgt spid="3">
+                                            <p:txEl>
+                                              <p:pRg st="1" end="1"/>
+                                            </p:txEl>
+                                          </p:spTgt>
+                                        </p:tgtEl>
+                                        <p:attrNameLst>
+                                          <p:attrName>style.visibility</p:attrName>
+                                        </p:attrNameLst>
+                                      </p:cBhvr>
+                                      <p:to>
+                                        <p:strVal val="visible"/>
+                                      </p:to>
+                                    </p:set>
+                                  </p:childTnLst>
+                                </p:cTn>
+                              </p:par>
+                            </p:childTnLst>
+                          </p:cTn>
+                        </p:par>
+                      </p:childTnLst>
+                    </p:cTn>
+                  </p:par>
+                  <p:par>
+                    <p:cTn id="11" fill="hold">
+                      <p:stCondLst>
+                        <p:cond delay="indefinite"/>
+                      </p:stCondLst>
+                      <p:childTnLst>
+                        <p:par>
+                          <p:cTn id="12" fill="hold">
+                            <p:stCondLst>
+                              <p:cond delay="0"/>
+                            </p:stCondLst>
+                            <p:childTnLst>
+                              <p:par>
+                                <p:cTn id="13" presetID="1" presetClass="entr" presetSubtype="0" fill="hold" nodeType="clickEffect">
+                                  <p:stCondLst>
+                                    <p:cond delay="0"/>
+                                  </p:stCondLst>
+                                  <p:childTnLst>
+                                    <p:set>
+                                      <p:cBhvr>
+                                        <p:cTn id="14" dur="1" fill="hold">
+                                          <p:stCondLst>
+                                            <p:cond delay="0"/>
+                                          </p:stCondLst>
+                                        </p:cTn>
+                                        <p:tgtEl>
+                                          <p:spTgt spid="3">
+                                            <p:txEl>
+                                              <p:pRg st="2" end="2"/>
+                                            </p:txEl>
+                                          </p:spTgt>
+                                        </p:tgtEl>
+                                        <p:attrNameLst>
+                                          <p:attrName>style.visibility</p:attrName>
+                                        </p:attrNameLst>
+                                      </p:cBhvr>
+                                      <p:to>
+                                        <p:strVal val="visible"/>
+                                      </p:to>
+                                    </p:set>
+                                  </p:childTnLst>
+                                </p:cTn>
+                              </p:par>
+                            </p:childTnLst>
+                          </p:cTn>
+                        </p:par>
+                      </p:childTnLst>
+                    </p:cTn>
+                  </p:par>
+                  <p:par>
+                    <p:cTn id="15" fill="hold">
+                      <p:stCondLst>
+                        <p:cond delay="indefinite"/>
+                      </p:stCondLst>
+                      <p:childTnLst>
+                        <p:par>
+                          <p:cTn id="16" fill="hold">
+                            <p:stCondLst>
+                              <p:cond delay="0"/>
+                            </p:stCondLst>
+                            <p:childTnLst>
+                              <p:par>
+                                <p:cTn id="17" presetID="1" presetClass="entr" presetSubtype="0" fill="hold" nodeType="clickEffect">
+                                  <p:stCondLst>
+                                    <p:cond delay="0"/>
+                                  </p:stCondLst>
+                                  <p:childTnLst>
+                                    <p:set>
+                                      <p:cBhvr>
+                                        <p:cTn id="18" dur="1" fill="hold">
+                                          <p:stCondLst>
+                                            <p:cond delay="0"/>
+                                          </p:stCondLst>
+                                        </p:cTn>
+                                        <p:tgtEl>
+                                          <p:spTgt spid="3">
+                                            <p:txEl>
+                                              <p:pRg st="3" end="3"/>
+                                            </p:txEl>
+                                          </p:spTgt>
+                                        </p:tgtEl>
+                                        <p:attrNameLst>
+                                          <p:attrName>style.visibility</p:attrName>
+                                        </p:attrNameLst>
+                                      </p:cBhvr>
+                                      <p:to>
+                                        <p:strVal val="visible"/>
+                                      </p:to>
+                                    </p:set>
+                                  </p:childTnLst>
+                                </p:cTn>
+                              </p:par>
+                            </p:childTnLst>
+                          </p:cTn>
+                        </p:par>
+                      </p:childTnLst>
+                    </p:cTn>
+                  </p:par>
+                  <p:par>
+                    <p:cTn id="19" fill="hold">
+                      <p:stCondLst>
+                        <p:cond delay="indefinite"/>
+                      </p:stCondLst>
+                      <p:childTnLst>
+                        <p:par>
+                          <p:cTn id="20" fill="hold">
+                            <p:stCondLst>
+                              <p:cond delay="0"/>
+                            </p:stCondLst>
+                            <p:childTnLst>
+                              <p:par>
+                                <p:cTn id="21" presetID="1" presetClass="entr" presetSubtype="0" fill="hold" nodeType="clickEffect">
+                                  <p:stCondLst>
+                                    <p:cond delay="0"/>
+                                  </p:stCondLst>
+                                  <p:childTnLst>
+                                    <p:set>
+                                      <p:cBhvr>
+                                        <p:cTn id="22" dur="1" fill="hold">
+                                          <p:stCondLst>
+                                            <p:cond delay="0"/>
+                                          </p:stCondLst>
+                                        </p:cTn>
+                                        <p:tgtEl>
+                                          <p:spTgt spid="3">
+                                            <p:txEl>
+                                              <p:pRg st="4" end="4"/>
+                                            </p:txEl>
+                                          </p:spTgt>
+                                        </p:tgtEl>
+                                        <p:attrNameLst>
+                                          <p:attrName>style.visibility</p:attrName>
+                                        </p:attrNameLst>
+                                      </p:cBhvr>
+                                      <p:to>
+                                        <p:strVal val="visible"/>
+                                      </p:to>
+                                    </p:set>
+                                  </p:childTnLst>
+                                </p:cTn>
+                              </p:par>
+                              <p:par>
+                                <p:cTn id="23" presetID="1" presetClass="entr" presetSubtype="0" fill="hold" nodeType="withEffect">
+                                  <p:stCondLst>
+                                    <p:cond delay="0"/>
+                                  </p:stCondLst>
+                                  <p:childTnLst>
+                                    <p:set>
+                                      <p:cBhvr>
+                                        <p:cTn id="24" dur="1" fill="hold">
+                                          <p:stCondLst>
+                                            <p:cond delay="0"/>
+                                          </p:stCondLst>
+                                        </p:cTn>
+                                        <p:tgtEl>
+                                          <p:spTgt spid="3">
+                                            <p:txEl>
+                                              <p:pRg st="5" end="5"/>
+                                            </p:txEl>
+                                          </p:spTgt>
+                                        </p:tgtEl>
+                                        <p:attrNameLst>
+                                          <p:attrName>style.visibility</p:attrName>
+                                        </p:attrNameLst>
+                                      </p:cBhvr>
+                                      <p:to>
+                                        <p:strVal val="visible"/>
+                                      </p:to>
+                                    </p:set>
+                                  </p:childTnLst>
+                                </p:cTn>
+                              </p:par>
+                              <p:par>
+                                <p:cTn id="25" presetID="1" presetClass="entr" presetSubtype="0" fill="hold" nodeType="withEffect">
+                                  <p:stCondLst>
+                                    <p:cond delay="0"/>
+                                  </p:stCondLst>
+                                  <p:childTnLst>
+                                    <p:set>
+                                      <p:cBhvr>
+                                        <p:cTn id="26" dur="1" fill="hold">
+                                          <p:stCondLst>
+                                            <p:cond delay="0"/>
+                                          </p:stCondLst>
+                                        </p:cTn>
+                                        <p:tgtEl>
+                                          <p:spTgt spid="3">
+                                            <p:txEl>
+                                              <p:pRg st="6" end="6"/>
+                                            </p:txEl>
+                                          </p:spTgt>
+                                        </p:tgtEl>
+                                        <p:attrNameLst>
+                                          <p:attrName>style.visibility</p:attrName>
+                                        </p:attrNameLst>
+                                      </p:cBhvr>
+                                      <p:to>
+                                        <p:strVal val="visible"/>
+                                      </p:to>
+                                    </p:set>
+                                  </p:childTnLst>
+                                </p:cTn>
+                              </p:par>
+                            </p:childTnLst>
+                          </p:cTn>
+                        </p:par>
+                      </p:childTnLst>
+                    </p:cTn>
+                  </p:par>
+                  <p:par>
+                    <p:cTn id="27" fill="hold">
+                      <p:stCondLst>
+                        <p:cond delay="indefinite"/>
+                      </p:stCondLst>
+                      <p:childTnLst>
+                        <p:par>
+                          <p:cTn id="28" fill="hold">
+                            <p:stCondLst>
+                              <p:cond delay="0"/>
+                            </p:stCondLst>
+                            <p:childTnLst>
+                              <p:par>
+                                <p:cTn id="29" presetID="1" presetClass="entr" presetSubtype="0" fill="hold" grpId="0" nodeType="clickEffect">
+                                  <p:stCondLst>
+                                    <p:cond delay="0"/>
+                                  </p:stCondLst>
+                                  <p:childTnLst>
+                                    <p:set>
+                                      <p:cBhvr>
+                                        <p:cTn id="30" dur="1" fill="hold">
+                                          <p:stCondLst>
+                                            <p:cond delay="0"/>
+                                          </p:stCondLst>
+                                        </p:cTn>
+                                        <p:tgtEl>
+                                          <p:spTgt spid="4"/>
+                                        </p:tgtEl>
+                                        <p:attrNameLst>
+                                          <p:attrName>style.visibility</p:attrName>
+                                        </p:attrNameLst>
+                                      </p:cBhvr>
+                                      <p:to>
+                                        <p:strVal val="visible"/>
+                                      </p:to>
+                                    </p:set>
+                                  </p:childTnLst>
+                                </p:cTn>
+                              </p:par>
+                              <p:par>
+                                <p:cTn id="31" presetID="1" presetClass="entr" presetSubtype="0" fill="hold" grpId="0" nodeType="withEffect">
+                                  <p:stCondLst>
+                                    <p:cond delay="0"/>
+                                  </p:stCondLst>
+                                  <p:childTnLst>
+                                    <p:set>
+                                      <p:cBhvr>
+                                        <p:cTn id="32" dur="1" fill="hold">
+                                          <p:stCondLst>
+                                            <p:cond delay="0"/>
+                                          </p:stCondLst>
+                                        </p:cTn>
+                                        <p:tgtEl>
+                                          <p:spTgt spid="5"/>
+                                        </p:tgtEl>
+                                        <p:attrNameLst>
+                                          <p:attrName>style.visibility</p:attrName>
+                                        </p:attrNameLst>
+                                      </p:cBhvr>
+                                      <p:to>
+                                        <p:strVal val="visible"/>
+                                      </p:to>
+                                    </p:set>
+                                  </p:childTnLst>
+                                </p:cTn>
+                              </p:par>
+                            </p:childTnLst>
+                          </p:cTn>
+                        </p:par>
+                      </p:childTnLst>
+                    </p:cTn>
+                  </p:par>
+                  <p:par>
+                    <p:cTn id="33" fill="hold">
+                      <p:stCondLst>
+                        <p:cond delay="indefinite"/>
+                      </p:stCondLst>
+                      <p:childTnLst>
+                        <p:par>
+                          <p:cTn id="34" fill="hold">
+                            <p:stCondLst>
+                              <p:cond delay="0"/>
+                            </p:stCondLst>
+                            <p:childTnLst>
+                              <p:par>
+                                <p:cTn id="35" presetID="1" presetClass="entr" presetSubtype="0" fill="hold" nodeType="clickEffect">
+                                  <p:stCondLst>
+                                    <p:cond delay="0"/>
+                                  </p:stCondLst>
+                                  <p:childTnLst>
+                                    <p:set>
+                                      <p:cBhvr>
+                                        <p:cTn id="36" dur="1" fill="hold">
+                                          <p:stCondLst>
+                                            <p:cond delay="0"/>
+                                          </p:stCondLst>
+                                        </p:cTn>
+                                        <p:tgtEl>
+                                          <p:spTgt spid="3">
+                                            <p:txEl>
+                                              <p:pRg st="7" end="7"/>
+                                            </p:txEl>
+                                          </p:spTgt>
+                                        </p:tgtEl>
+                                        <p:attrNameLst>
+                                          <p:attrName>style.visibility</p:attrName>
+                                        </p:attrNameLst>
+                                      </p:cBhvr>
+                                      <p:to>
+                                        <p:strVal val="visible"/>
+                                      </p:to>
+                                    </p:set>
+                                  </p:childTnLst>
+                                </p:cTn>
+                              </p:par>
+                            </p:childTnLst>
+                          </p:cTn>
+                        </p:par>
+                      </p:childTnLst>
+                    </p:cTn>
+                  </p:par>
+                </p:childTnLst>
+              </p:cTn>
+              <p:prevCondLst>
+                <p:cond evt="onPrev" delay="0">
+                  <p:tgtEl>
+                    <p:sldTgt/>
+                  </p:tgtEl>
+                </p:cond>
+              </p:prevCondLst>
+              <p:nextCondLst>
+                <p:cond evt="onNext" delay="0">
+                  <p:tgtEl>
+                    <p:sldTgt/>
+                  </p:tgtEl>
+                </p:cond>
+              </p:nextCondLst>
+            </p:seq>
+          </p:childTnLst>
+        </p:cTn>
+      </p:par>
+    </p:tnLst>
+    <p:bldLst>
+      <p:bldP spid="4" grpId="0" animBg="1"/>
+      <p:bldP spid="5" grpId="0"/>
+    </p:bldLst>
+  </p:timing>
+</p:sld>
+</file>
+
+<file path=ppt/slides/slide21.xml><?xml version="1.0" encoding="utf-8"?>
+<p:sld xmlns:a="http://schemas.openxmlformats.org/drawingml/2006/main" xmlns:r="http://schemas.openxmlformats.org/officeDocument/2006/relationships" xmlns:p="http://schemas.openxmlformats.org/presentationml/2006/main">
+  <p:cSld>
+    <p:spTree>
+      <p:nvGrpSpPr>
+        <p:cNvPr id="1" name=""/>
+        <p:cNvGrpSpPr/>
+        <p:nvPr/>
+      </p:nvGrpSpPr>
+      <p:grpSpPr>
+        <a:xfrm>
+          <a:off x="0" y="0"/>
+          <a:ext cx="0" cy="0"/>
+          <a:chOff x="0" y="0"/>
+          <a:chExt cx="0" cy="0"/>
+        </a:xfrm>
+      </p:grpSpPr>
+      <p:sp>
+        <p:nvSpPr>
+          <p:cNvPr id="2" name="标题 1">
+            <a:extLst>
+              <a:ext uri="{FF2B5EF4-FFF2-40B4-BE49-F238E27FC236}">
+                <a16:creationId xmlns:a16="http://schemas.microsoft.com/office/drawing/2014/main" id="{5854A3FD-3CA3-4958-93EE-B540B1AFF031}"/>
+              </a:ext>
+            </a:extLst>
+          </p:cNvPr>
+          <p:cNvSpPr>
+            <a:spLocks noGrp="1"/>
+          </p:cNvSpPr>
+          <p:nvPr>
+            <p:ph type="title"/>
+          </p:nvPr>
+        </p:nvSpPr>
+        <p:spPr/>
+        <p:txBody>
+          <a:bodyPr>
+            <a:normAutofit/>
+          </a:bodyPr>
+          <a:lstStyle/>
+          <a:p>
+            <a:r>
+              <a:rPr lang="en-US" altLang="zh-CN" sz="3600" dirty="0"/>
+              <a:t>Git LFS</a:t>
+            </a:r>
+            <a:endParaRPr lang="zh-CN" altLang="en-US" sz="3600" dirty="0"/>
+          </a:p>
+        </p:txBody>
+      </p:sp>
+      <p:sp>
+        <p:nvSpPr>
+          <p:cNvPr id="3" name="内容占位符 2">
+            <a:extLst>
+              <a:ext uri="{FF2B5EF4-FFF2-40B4-BE49-F238E27FC236}">
+                <a16:creationId xmlns:a16="http://schemas.microsoft.com/office/drawing/2014/main" id="{C6945FC7-E300-45DA-BE7C-5F13D6191314}"/>
+              </a:ext>
+            </a:extLst>
+          </p:cNvPr>
+          <p:cNvSpPr>
+            <a:spLocks noGrp="1"/>
+          </p:cNvSpPr>
+          <p:nvPr>
+            <p:ph idx="1"/>
+          </p:nvPr>
+        </p:nvSpPr>
+        <p:spPr/>
+        <p:txBody>
+          <a:bodyPr/>
+          <a:lstStyle/>
+          <a:p>
+            <a:r>
+              <a:rPr lang="en-US" altLang="zh-CN" dirty="0"/>
+              <a:t>Git LFS is a Git extension that allows users to save space by storing binary files in a different location</a:t>
+            </a:r>
+          </a:p>
+          <a:p>
+            <a:endParaRPr lang="en-US" altLang="zh-CN" dirty="0"/>
+          </a:p>
+          <a:p>
+            <a:r>
+              <a:rPr lang="en-US" altLang="zh-CN" dirty="0"/>
+              <a:t>Light weight reference object </a:t>
+            </a:r>
+            <a:r>
+              <a:rPr lang="en-US" altLang="zh-CN" dirty="0">
+                <a:sym typeface="Wingdings" panose="05000000000000000000" pitchFamily="2" charset="2"/>
+              </a:rPr>
+              <a:t> LFS server</a:t>
+            </a:r>
+          </a:p>
+          <a:p>
+            <a:r>
+              <a:rPr lang="en-US" altLang="zh-CN" dirty="0">
+                <a:sym typeface="Wingdings" panose="05000000000000000000" pitchFamily="2" charset="2"/>
+              </a:rPr>
+              <a:t>Link to the actual asset on the Git LFS server</a:t>
+            </a:r>
+          </a:p>
+          <a:p>
+            <a:endParaRPr lang="en-US" altLang="zh-CN" dirty="0">
+              <a:sym typeface="Wingdings" panose="05000000000000000000" pitchFamily="2" charset="2"/>
+            </a:endParaRPr>
+          </a:p>
+          <a:p>
+            <a:r>
+              <a:rPr lang="en-US" altLang="zh-CN" dirty="0"/>
+              <a:t>How to use Git LFS on </a:t>
+            </a:r>
+            <a:r>
+              <a:rPr lang="en-US" altLang="zh-CN" dirty="0" err="1"/>
+              <a:t>GitKraken</a:t>
+            </a:r>
+            <a:endParaRPr lang="en-US" altLang="zh-CN" dirty="0"/>
+          </a:p>
+        </p:txBody>
+      </p:sp>
+    </p:spTree>
+    <p:extLst>
+      <p:ext uri="{BB962C8B-B14F-4D97-AF65-F5344CB8AC3E}">
+        <p14:creationId xmlns:p14="http://schemas.microsoft.com/office/powerpoint/2010/main" val="1781988864"/>
+      </p:ext>
+    </p:extLst>
+  </p:cSld>
+  <p:clrMapOvr>
+    <a:masterClrMapping/>
+  </p:clrMapOvr>
+  <p:timing>
+    <p:tnLst>
+      <p:par>
+        <p:cTn id="1" dur="indefinite" restart="never" nodeType="tmRoot">
+          <p:childTnLst>
+            <p:seq concurrent="1" nextAc="seek">
+              <p:cTn id="2" dur="indefinite" nodeType="mainSeq">
+                <p:childTnLst>
+                  <p:par>
+                    <p:cTn id="3" fill="hold">
+                      <p:stCondLst>
+                        <p:cond delay="indefinite"/>
+                      </p:stCondLst>
+                      <p:childTnLst>
+                        <p:par>
+                          <p:cTn id="4" fill="hold">
+                            <p:stCondLst>
+                              <p:cond delay="0"/>
+                            </p:stCondLst>
+                            <p:childTnLst>
+                              <p:par>
+                                <p:cTn id="5" presetID="1" presetClass="entr" presetSubtype="0" fill="hold" nodeType="clickEffect">
+                                  <p:stCondLst>
+                                    <p:cond delay="0"/>
+                                  </p:stCondLst>
+                                  <p:childTnLst>
+                                    <p:set>
+                                      <p:cBhvr>
+                                        <p:cTn id="6" dur="1" fill="hold">
+                                          <p:stCondLst>
+                                            <p:cond delay="0"/>
+                                          </p:stCondLst>
+                                        </p:cTn>
+                                        <p:tgtEl>
+                                          <p:spTgt spid="3">
+                                            <p:txEl>
+                                              <p:pRg st="0" end="0"/>
+                                            </p:txEl>
+                                          </p:spTgt>
+                                        </p:tgtEl>
+                                        <p:attrNameLst>
+                                          <p:attrName>style.visibility</p:attrName>
+                                        </p:attrNameLst>
+                                      </p:cBhvr>
+                                      <p:to>
+                                        <p:strVal val="visible"/>
+                                      </p:to>
+                                    </p:set>
+                                  </p:childTnLst>
+                                </p:cTn>
+                              </p:par>
+                            </p:childTnLst>
+                          </p:cTn>
+                        </p:par>
+                      </p:childTnLst>
+                    </p:cTn>
+                  </p:par>
+                  <p:par>
+                    <p:cTn id="7" fill="hold">
+                      <p:stCondLst>
+                        <p:cond delay="indefinite"/>
+                      </p:stCondLst>
+                      <p:childTnLst>
+                        <p:par>
+                          <p:cTn id="8" fill="hold">
+                            <p:stCondLst>
+                              <p:cond delay="0"/>
+                            </p:stCondLst>
+                            <p:childTnLst>
+                              <p:par>
+                                <p:cTn id="9" presetID="1" presetClass="entr" presetSubtype="0" fill="hold" nodeType="clickEffect">
+                                  <p:stCondLst>
+                                    <p:cond delay="0"/>
+                                  </p:stCondLst>
+                                  <p:childTnLst>
+                                    <p:set>
+                                      <p:cBhvr>
+                                        <p:cTn id="10" dur="1" fill="hold">
+                                          <p:stCondLst>
+                                            <p:cond delay="0"/>
+                                          </p:stCondLst>
+                                        </p:cTn>
+                                        <p:tgtEl>
+                                          <p:spTgt spid="3">
+                                            <p:txEl>
+                                              <p:pRg st="2" end="2"/>
+                                            </p:txEl>
+                                          </p:spTgt>
+                                        </p:tgtEl>
+                                        <p:attrNameLst>
+                                          <p:attrName>style.visibility</p:attrName>
+                                        </p:attrNameLst>
+                                      </p:cBhvr>
+                                      <p:to>
+                                        <p:strVal val="visible"/>
+                                      </p:to>
+                                    </p:set>
+                                  </p:childTnLst>
+                                </p:cTn>
+                              </p:par>
+                              <p:par>
+                                <p:cTn id="11" presetID="1" presetClass="entr" presetSubtype="0" fill="hold" nodeType="withEffect">
+                                  <p:stCondLst>
+                                    <p:cond delay="0"/>
+                                  </p:stCondLst>
+                                  <p:childTnLst>
+                                    <p:set>
+                                      <p:cBhvr>
+                                        <p:cTn id="12" dur="1" fill="hold">
+                                          <p:stCondLst>
+                                            <p:cond delay="0"/>
+                                          </p:stCondLst>
+                                        </p:cTn>
+                                        <p:tgtEl>
+                                          <p:spTgt spid="3">
+                                            <p:txEl>
+                                              <p:pRg st="3" end="3"/>
+                                            </p:txEl>
+                                          </p:spTgt>
+                                        </p:tgtEl>
+                                        <p:attrNameLst>
+                                          <p:attrName>style.visibility</p:attrName>
+                                        </p:attrNameLst>
+                                      </p:cBhvr>
+                                      <p:to>
+                                        <p:strVal val="visible"/>
+                                      </p:to>
+                                    </p:set>
+                                  </p:childTnLst>
+                                </p:cTn>
+                              </p:par>
+                            </p:childTnLst>
+                          </p:cTn>
+                        </p:par>
+                      </p:childTnLst>
+                    </p:cTn>
+                  </p:par>
+                  <p:par>
+                    <p:cTn id="13" fill="hold">
+                      <p:stCondLst>
+                        <p:cond delay="indefinite"/>
+                      </p:stCondLst>
+                      <p:childTnLst>
+                        <p:par>
+                          <p:cTn id="14" fill="hold">
+                            <p:stCondLst>
+                              <p:cond delay="0"/>
+                            </p:stCondLst>
+                            <p:childTnLst>
+                              <p:par>
+                                <p:cTn id="15" presetID="1" presetClass="entr" presetSubtype="0" fill="hold" nodeType="clickEffect">
+                                  <p:stCondLst>
+                                    <p:cond delay="0"/>
+                                  </p:stCondLst>
+                                  <p:childTnLst>
+                                    <p:set>
+                                      <p:cBhvr>
+                                        <p:cTn id="16" dur="1" fill="hold">
+                                          <p:stCondLst>
+                                            <p:cond delay="0"/>
+                                          </p:stCondLst>
+                                        </p:cTn>
+                                        <p:tgtEl>
+                                          <p:spTgt spid="3">
+                                            <p:txEl>
+                                              <p:charRg st="199" end="231"/>
+                                            </p:txEl>
+                                          </p:spTgt>
+                                        </p:tgtEl>
+                                        <p:attrNameLst>
+                                          <p:attrName>style.visibility</p:attrName>
+                                        </p:attrNameLst>
+                                      </p:cBhvr>
+                                      <p:to>
+                                        <p:strVal val="visible"/>
+                                      </p:to>
+                                    </p:set>
+                                  </p:childTnLst>
+                                </p:cTn>
+                              </p:par>
+                            </p:childTnLst>
+                          </p:cTn>
+                        </p:par>
+                      </p:childTnLst>
+                    </p:cTn>
+                  </p:par>
+                </p:childTnLst>
+              </p:cTn>
+              <p:prevCondLst>
+                <p:cond evt="onPrev" delay="0">
+                  <p:tgtEl>
+                    <p:sldTgt/>
+                  </p:tgtEl>
+                </p:cond>
+              </p:prevCondLst>
+              <p:nextCondLst>
+                <p:cond evt="onNext" delay="0">
+                  <p:tgtEl>
+                    <p:sldTgt/>
+                  </p:tgtEl>
+                </p:cond>
+              </p:nextCondLst>
+            </p:seq>
+          </p:childTnLst>
+        </p:cTn>
+      </p:par>
+    </p:tnLst>
   </p:timing>
 </p:sld>
 </file>

</xml_diff>